<commit_message>
220611 SW: login, signup form
</commit_message>
<xml_diff>
--- a/기획/03_Design.pptx
+++ b/기획/03_Design.pptx
@@ -210,7 +210,7 @@
           <a:p>
             <a:fld id="{A7A9A9EE-701E-43E3-94BB-8AAB9010E9CB}" type="datetimeFigureOut">
               <a:rPr lang="ko-KR" altLang="en-US" smtClean="0"/>
-              <a:t>2022-06-10</a:t>
+              <a:t>2022-06-11</a:t>
             </a:fld>
             <a:endParaRPr lang="ko-KR" altLang="en-US"/>
           </a:p>
@@ -693,7 +693,7 @@
           <a:p>
             <a:fld id="{2F596B04-3163-4B29-9886-675A71913251}" type="datetimeFigureOut">
               <a:rPr lang="ko-KR" altLang="en-US" smtClean="0"/>
-              <a:t>2022-06-10</a:t>
+              <a:t>2022-06-11</a:t>
             </a:fld>
             <a:endParaRPr lang="ko-KR" altLang="en-US"/>
           </a:p>
@@ -863,7 +863,7 @@
           <a:p>
             <a:fld id="{2F596B04-3163-4B29-9886-675A71913251}" type="datetimeFigureOut">
               <a:rPr lang="ko-KR" altLang="en-US" smtClean="0"/>
-              <a:t>2022-06-10</a:t>
+              <a:t>2022-06-11</a:t>
             </a:fld>
             <a:endParaRPr lang="ko-KR" altLang="en-US"/>
           </a:p>
@@ -1043,7 +1043,7 @@
           <a:p>
             <a:fld id="{2F596B04-3163-4B29-9886-675A71913251}" type="datetimeFigureOut">
               <a:rPr lang="ko-KR" altLang="en-US" smtClean="0"/>
-              <a:t>2022-06-10</a:t>
+              <a:t>2022-06-11</a:t>
             </a:fld>
             <a:endParaRPr lang="ko-KR" altLang="en-US"/>
           </a:p>
@@ -1213,7 +1213,7 @@
           <a:p>
             <a:fld id="{2F596B04-3163-4B29-9886-675A71913251}" type="datetimeFigureOut">
               <a:rPr lang="ko-KR" altLang="en-US" smtClean="0"/>
-              <a:t>2022-06-10</a:t>
+              <a:t>2022-06-11</a:t>
             </a:fld>
             <a:endParaRPr lang="ko-KR" altLang="en-US"/>
           </a:p>
@@ -1459,7 +1459,7 @@
           <a:p>
             <a:fld id="{2F596B04-3163-4B29-9886-675A71913251}" type="datetimeFigureOut">
               <a:rPr lang="ko-KR" altLang="en-US" smtClean="0"/>
-              <a:t>2022-06-10</a:t>
+              <a:t>2022-06-11</a:t>
             </a:fld>
             <a:endParaRPr lang="ko-KR" altLang="en-US"/>
           </a:p>
@@ -1691,7 +1691,7 @@
           <a:p>
             <a:fld id="{2F596B04-3163-4B29-9886-675A71913251}" type="datetimeFigureOut">
               <a:rPr lang="ko-KR" altLang="en-US" smtClean="0"/>
-              <a:t>2022-06-10</a:t>
+              <a:t>2022-06-11</a:t>
             </a:fld>
             <a:endParaRPr lang="ko-KR" altLang="en-US"/>
           </a:p>
@@ -2058,7 +2058,7 @@
           <a:p>
             <a:fld id="{2F596B04-3163-4B29-9886-675A71913251}" type="datetimeFigureOut">
               <a:rPr lang="ko-KR" altLang="en-US" smtClean="0"/>
-              <a:t>2022-06-10</a:t>
+              <a:t>2022-06-11</a:t>
             </a:fld>
             <a:endParaRPr lang="ko-KR" altLang="en-US"/>
           </a:p>
@@ -2176,7 +2176,7 @@
           <a:p>
             <a:fld id="{2F596B04-3163-4B29-9886-675A71913251}" type="datetimeFigureOut">
               <a:rPr lang="ko-KR" altLang="en-US" smtClean="0"/>
-              <a:t>2022-06-10</a:t>
+              <a:t>2022-06-11</a:t>
             </a:fld>
             <a:endParaRPr lang="ko-KR" altLang="en-US"/>
           </a:p>
@@ -2271,7 +2271,7 @@
           <a:p>
             <a:fld id="{2F596B04-3163-4B29-9886-675A71913251}" type="datetimeFigureOut">
               <a:rPr lang="ko-KR" altLang="en-US" smtClean="0"/>
-              <a:t>2022-06-10</a:t>
+              <a:t>2022-06-11</a:t>
             </a:fld>
             <a:endParaRPr lang="ko-KR" altLang="en-US"/>
           </a:p>
@@ -2548,7 +2548,7 @@
           <a:p>
             <a:fld id="{2F596B04-3163-4B29-9886-675A71913251}" type="datetimeFigureOut">
               <a:rPr lang="ko-KR" altLang="en-US" smtClean="0"/>
-              <a:t>2022-06-10</a:t>
+              <a:t>2022-06-11</a:t>
             </a:fld>
             <a:endParaRPr lang="ko-KR" altLang="en-US"/>
           </a:p>
@@ -2801,7 +2801,7 @@
           <a:p>
             <a:fld id="{2F596B04-3163-4B29-9886-675A71913251}" type="datetimeFigureOut">
               <a:rPr lang="ko-KR" altLang="en-US" smtClean="0"/>
-              <a:t>2022-06-10</a:t>
+              <a:t>2022-06-11</a:t>
             </a:fld>
             <a:endParaRPr lang="ko-KR" altLang="en-US"/>
           </a:p>
@@ -3014,7 +3014,7 @@
           <a:p>
             <a:fld id="{2F596B04-3163-4B29-9886-675A71913251}" type="datetimeFigureOut">
               <a:rPr lang="ko-KR" altLang="en-US" smtClean="0"/>
-              <a:t>2022-06-10</a:t>
+              <a:t>2022-06-11</a:t>
             </a:fld>
             <a:endParaRPr lang="ko-KR" altLang="en-US"/>
           </a:p>
@@ -4454,6 +4454,36 @@
             <a:r>
               <a:rPr lang="en-US" altLang="ko-KR" dirty="0" smtClean="0"/>
               <a:t>?</a:t>
+            </a:r>
+            <a:endParaRPr lang="ko-KR" altLang="en-US" dirty="0"/>
+          </a:p>
+        </p:txBody>
+      </p:sp>
+      <p:sp>
+        <p:nvSpPr>
+          <p:cNvPr id="2" name="TextBox 1"/>
+          <p:cNvSpPr txBox="1"/>
+          <p:nvPr/>
+        </p:nvSpPr>
+        <p:spPr>
+          <a:xfrm>
+            <a:off x="812799" y="535709"/>
+            <a:ext cx="2264063" cy="369332"/>
+          </a:xfrm>
+          <a:prstGeom prst="rect">
+            <a:avLst/>
+          </a:prstGeom>
+          <a:noFill/>
+        </p:spPr>
+        <p:txBody>
+          <a:bodyPr wrap="square" rtlCol="0">
+            <a:spAutoFit/>
+          </a:bodyPr>
+          <a:lstStyle/>
+          <a:p>
+            <a:r>
+              <a:rPr lang="en-US" altLang="ko-KR" dirty="0" err="1" smtClean="0"/>
+              <a:t>MainPage</a:t>
             </a:r>
             <a:endParaRPr lang="ko-KR" altLang="en-US" dirty="0"/>
           </a:p>

</xml_diff>